<commit_message>
Update DSC 680 Project 2 Presentation.pptx
</commit_message>
<xml_diff>
--- a/DSC 680 Project 2 Presentation.pptx
+++ b/DSC 680 Project 2 Presentation.pptx
@@ -876,7 +876,7 @@
             </a:pPr>
             <a:r>
               <a:rPr lang="en-US" dirty="0"/>
-              <a:t>A few assumptions were made to proceed with this project. First and foremost, it was assumed that movie trends and styles would remain consistent so the model wouldn’t have to be updated every few years. Second, it was assumed any country could use it, not just the USA. Third, it was assumed that &lt;1 was the lowest error that could be achieved.</a:t>
+              <a:t>A few assumptions were made to proceed with this project. First and foremost, it was assumed that heart disease is one disease rather than related diseases under the same umbrella term. Second, it was assumed that the patients answered the BRFSS truthfully and the dataset obtained is accurate.</a:t>
             </a:r>
           </a:p>
         </p:txBody>
@@ -977,13 +977,7 @@
           </a:bodyPr>
           <a:lstStyle/>
           <a:p>
-            <a:pPr marL="0" lvl="0" indent="0" algn="l" rtl="0">
-              <a:spcBef>
-                <a:spcPts val="0"/>
-              </a:spcBef>
-              <a:spcAft>
-                <a:spcPts val="0"/>
-              </a:spcAft>
+            <a:pPr marL="158750" indent="0">
               <a:buNone/>
             </a:pPr>
             <a:r>
@@ -993,7 +987,73 @@
                 </a:solidFill>
                 <a:latin typeface="Arial" panose="020B0604020202020204" pitchFamily="34" charset="0"/>
               </a:rPr>
-              <a:t>This model wasn’t without its challenges. First, the amount of computing power was limited, lengthening time. Fortunately there was enough time to account for this. Second, there were too many features in the dataset and had to be reduced to avoid overfitting. Third, some of the assumptions made cannot be used in reality.</a:t>
+              <a:t>This model wasn’t without its challenges. Many models were cycled through before random forest: </a:t>
+            </a:r>
+          </a:p>
+          <a:p>
+            <a:pPr marL="457200" indent="-298450"/>
+            <a:r>
+              <a:rPr lang="en-US" sz="1800" b="0" i="0" u="none" strike="noStrike" baseline="0" dirty="0">
+                <a:solidFill>
+                  <a:srgbClr val="000000"/>
+                </a:solidFill>
+                <a:latin typeface="Arial" panose="020B0604020202020204" pitchFamily="34" charset="0"/>
+              </a:rPr>
+              <a:t>Logistic regression was the first logical choice for binary classification since it also handles large datasets, but it quickly proved to be undesirable, producing accuracy and precision scores of 72% and 73%, respectively. Medical models must be very accurate as patients’ lives can be drastically affected by a false positive/negative. </a:t>
+            </a:r>
+          </a:p>
+          <a:p>
+            <a:pPr marL="457200" indent="-298450"/>
+            <a:r>
+              <a:rPr lang="en-US" sz="1800" b="0" i="0" u="none" strike="noStrike" baseline="0" dirty="0">
+                <a:solidFill>
+                  <a:srgbClr val="000000"/>
+                </a:solidFill>
+                <a:latin typeface="Arial" panose="020B0604020202020204" pitchFamily="34" charset="0"/>
+              </a:rPr>
+              <a:t>A </a:t>
+            </a:r>
+            <a:r>
+              <a:rPr lang="en-US" sz="1800" b="0" i="0" u="none" strike="noStrike" baseline="0" dirty="0" err="1">
+                <a:solidFill>
+                  <a:srgbClr val="000000"/>
+                </a:solidFill>
+                <a:latin typeface="Arial" panose="020B0604020202020204" pitchFamily="34" charset="0"/>
+              </a:rPr>
+              <a:t>Keras</a:t>
+            </a:r>
+            <a:r>
+              <a:rPr lang="en-US" sz="1800" b="0" i="0" u="none" strike="noStrike" baseline="0" dirty="0">
+                <a:solidFill>
+                  <a:srgbClr val="000000"/>
+                </a:solidFill>
+                <a:latin typeface="Arial" panose="020B0604020202020204" pitchFamily="34" charset="0"/>
+              </a:rPr>
+              <a:t> neural network was trained and tested next, which produced higher scores, but the network took many hours to run even after tuning hyperparameters. </a:t>
+            </a:r>
+          </a:p>
+          <a:p>
+            <a:pPr marL="457200" indent="-298450"/>
+            <a:r>
+              <a:rPr lang="en-US" sz="1800" b="0" i="0" u="none" strike="noStrike" baseline="0" dirty="0">
+                <a:solidFill>
+                  <a:srgbClr val="000000"/>
+                </a:solidFill>
+                <a:latin typeface="Arial" panose="020B0604020202020204" pitchFamily="34" charset="0"/>
+              </a:rPr>
+              <a:t>A random forest classifier was then selected. This classifier resulted in the high scores seen above, though its runtime still leaves something to be desired. </a:t>
+            </a:r>
+          </a:p>
+          <a:p>
+            <a:pPr marL="914400" lvl="1" indent="-298450"/>
+            <a:r>
+              <a:rPr lang="en-US" sz="1800" b="0" i="0" u="none" strike="noStrike" baseline="0" dirty="0">
+                <a:solidFill>
+                  <a:srgbClr val="000000"/>
+                </a:solidFill>
+                <a:latin typeface="Arial" panose="020B0604020202020204" pitchFamily="34" charset="0"/>
+              </a:rPr>
+              <a:t>More computing power will be needed to solve this problem for future uses on actual hospital data.</a:t>
             </a:r>
             <a:endParaRPr dirty="0"/>
           </a:p>
@@ -1101,7 +1161,15 @@
             </a:pPr>
             <a:r>
               <a:rPr lang="en-US" dirty="0"/>
-              <a:t>The model isn’t limited to movie score predictions. With training on a different dataset, a similar model could be applied to predicting the ratings of TV shows (which have many of the same features as movies). Even video games and songs could have their ratings predicted with a similar model.</a:t>
+              <a:t>The model isn’t limited to heart disease predictions. With training on a different dataset, a similar model could be applied to predicting whether a customer will buy a class of products. Most notably, it can be applied to cell phone providers </a:t>
+            </a:r>
+            <a:r>
+              <a:rPr lang="en-US"/>
+              <a:t>to predict which </a:t>
+            </a:r>
+            <a:r>
+              <a:rPr lang="en-US" dirty="0"/>
+              <a:t>customers will stay or leave within a certain time.</a:t>
             </a:r>
             <a:endParaRPr dirty="0"/>
           </a:p>
@@ -1166,61 +1234,69 @@
           <a:p>
             <a:r>
               <a:rPr lang="en-US" dirty="0"/>
-              <a:t>1. Random forest is more suitable to handle large datasets with numerical target variables</a:t>
+              <a:t>1. Yes. Boosting algorithms could have been tested as well, but there was not enough time.</a:t>
             </a:r>
           </a:p>
           <a:p>
             <a:r>
               <a:rPr lang="en-US" dirty="0"/>
-              <a:t>2. This is primarily a model for assigning ratings, so a similar model could be applied to rate places.</a:t>
+              <a:t>2. There should be enough computing power if each hospital possesses its own server.</a:t>
             </a:r>
           </a:p>
           <a:p>
             <a:r>
               <a:rPr lang="en-US" dirty="0"/>
-              <a:t>3. This assumption was founded on previous projects I’ve conducted.</a:t>
+              <a:t>3. Yes. A random sample of the data can be used rather than the whole data, as long as it’s sufficiently large for training.</a:t>
             </a:r>
           </a:p>
           <a:p>
             <a:r>
               <a:rPr lang="en-US" dirty="0"/>
-              <a:t>4. The main way to solve this problem is to acknowledge the bias to try and keep Hollywood a diverse industry.</a:t>
+              <a:t>4. The dataset would need another column specifying which disease the patient has if there is a “Yes” on heart disease.</a:t>
             </a:r>
           </a:p>
           <a:p>
             <a:r>
               <a:rPr lang="en-US" dirty="0"/>
-              <a:t>5. For changing trends, the model would have to be updated with a dataset of the newest films every few years.</a:t>
+              <a:t>5. Most of these diseases have similar enough risk factors that the model could predict whether a patient has one, but a separate column would still be needed to specify.</a:t>
             </a:r>
           </a:p>
           <a:p>
             <a:r>
               <a:rPr lang="en-US" dirty="0"/>
-              <a:t>6. Computing power shouldn’t be an issue on a larger scale since more powerful computer would be factored into the budget.</a:t>
+              <a:t>6. This model doesn’t work for other diseases, even if they have similar risks.</a:t>
             </a:r>
           </a:p>
           <a:p>
             <a:r>
               <a:rPr lang="en-US" dirty="0"/>
-              <a:t>7. Correlated features weakens the statistical power of a regression model in addition to taking up more storage.</a:t>
+              <a:t>7. Hyperparameter tuning for each model did not yield greater than a 0.5% increase in accuracy.</a:t>
             </a:r>
           </a:p>
           <a:p>
             <a:r>
               <a:rPr lang="en-US" dirty="0"/>
-              <a:t>8. One could, in theory, repeat the code in R instead of Python.</a:t>
+              <a:t>8. One could also use this model in predicting other disease risks given the right dataset.</a:t>
             </a:r>
           </a:p>
           <a:p>
             <a:r>
               <a:rPr lang="en-US" dirty="0"/>
-              <a:t>9. The model could have had the number of trees in the random forest or the max tree depth changed</a:t>
+              <a:t>9. Oversampling and </a:t>
             </a:r>
-          </a:p>
-          <a:p>
+            <a:r>
+              <a:rPr lang="en-US" dirty="0" err="1"/>
+              <a:t>undersampling</a:t>
+            </a:r>
             <a:r>
               <a:rPr lang="en-US" dirty="0"/>
-              <a:t>10. The overall number of people in the cast (actors and ensemble) could have been included </a:t>
+              <a:t> both balance the target variable, but oversampling increases the sample size.</a:t>
+            </a:r>
+          </a:p>
+          <a:p>
+            <a:r>
+              <a:rPr lang="en-US" dirty="0"/>
+              <a:t>10. There are several ways, but one way could be to use regulations and audit the companies.</a:t>
             </a:r>
           </a:p>
         </p:txBody>
@@ -1921,7 +1997,16 @@
             </a:pPr>
             <a:r>
               <a:rPr lang="en-US" dirty="0"/>
-              <a:t>Data “cleaning” was done to prepare the data for input into the model. First, blank rows in each column were filled with the average for that column, so there would be no missing data. Second, duplicate rows were removed to avoid a sample getting overrepresented. Third, a few key features were selected to avoid features being correlated to each other. A correlation matrix was built to find out which features were not correlated.</a:t>
+              <a:t>Data “cleaning” was done to prepare the data for input into the model. First, </a:t>
+            </a:r>
+            <a:r>
+              <a:rPr lang="en-US" sz="1800" b="0" i="0" u="none" strike="noStrike" baseline="0" dirty="0">
+                <a:solidFill>
+                  <a:srgbClr val="000000"/>
+                </a:solidFill>
+                <a:latin typeface="Arial" panose="020B0604020202020204" pitchFamily="34" charset="0"/>
+              </a:rPr>
+              <a:t>each feature was checked for NA values and non-numerical columns. No NA values were found, and any Boolean/multiclass columns had their strings replaced with integers (e.g., a five-category column received 0-4 as integers). Finally, because very few patients in the dataset had heart disease, those patients were oversampled to make the number of patients with and without heart disease equal. </a:t>
             </a:r>
             <a:endParaRPr dirty="0"/>
           </a:p>
@@ -2029,7 +2114,16 @@
             </a:pPr>
             <a:r>
               <a:rPr lang="en-US" dirty="0"/>
-              <a:t>The EDA step was conducted to gain insight into the data and find out what the model might predict. Here are a few selected graphs that were constructed.</a:t>
+              <a:t>The EDA step was conducted to gain insight into the data and </a:t>
+            </a:r>
+            <a:r>
+              <a:rPr lang="en-US" sz="1800" b="0" i="0" u="none" strike="noStrike" baseline="0" dirty="0">
+                <a:solidFill>
+                  <a:srgbClr val="000000"/>
+                </a:solidFill>
+                <a:latin typeface="Arial" panose="020B0604020202020204" pitchFamily="34" charset="0"/>
+              </a:rPr>
+              <a:t>ballpark the range that the accuracy and precision might fall under. Here are selected graphs that were part of the EDA process.</a:t>
             </a:r>
             <a:endParaRPr dirty="0"/>
           </a:p>
@@ -2137,7 +2231,7 @@
             </a:pPr>
             <a:r>
               <a:rPr lang="en-US" dirty="0"/>
-              <a:t>After training and testing the model, the following values for the error were output. Since the model was a regression model, mean average error, mean squared error, and root mean squared error were used to see how well it performed. All errors were less than one, indicating the model performed accurately. Conclusion: The model can be implemented!</a:t>
+              <a:t>After training and testing the model, the following values for the error were output. Since the model was a classifier, accuracy and precision were used to see how well it performed. Both values were above 90%, indicating the model performed very accurately. Conclusion: The model can be implemented!</a:t>
             </a:r>
             <a:endParaRPr dirty="0"/>
           </a:p>
@@ -8347,31 +8441,24 @@
             <a:pPr lvl="1"/>
             <a:r>
               <a:rPr lang="en-US" dirty="0"/>
-              <a:t>Movie styles constant</a:t>
+              <a:t>Heart disease is one disease</a:t>
             </a:r>
           </a:p>
           <a:p>
             <a:pPr lvl="1"/>
             <a:r>
               <a:rPr lang="en-US" dirty="0"/>
-              <a:t>Worldwide usage</a:t>
-            </a:r>
-          </a:p>
-          <a:p>
-            <a:pPr lvl="1"/>
-            <a:r>
-              <a:rPr lang="en-US" dirty="0"/>
-              <a:t>&lt;1 is a good error</a:t>
+              <a:t>BRFSS answered correctly</a:t>
             </a:r>
           </a:p>
         </p:txBody>
       </p:sp>
       <p:pic>
         <p:nvPicPr>
-          <p:cNvPr id="5122" name="Picture 2" descr="Just Worldwide | LinkedIn">
+          <p:cNvPr id="3074" name="Picture 2" descr="BRFSS Demystified - SparkMap">
             <a:extLst>
               <a:ext uri="{FF2B5EF4-FFF2-40B4-BE49-F238E27FC236}">
-                <a16:creationId xmlns:a16="http://schemas.microsoft.com/office/drawing/2014/main" id="{5928D09B-0B76-4FA7-868A-CA871A9331E7}"/>
+                <a16:creationId xmlns:a16="http://schemas.microsoft.com/office/drawing/2014/main" id="{01B49C59-1438-284D-075C-CD94C780B898}"/>
               </a:ext>
             </a:extLst>
           </p:cNvPr>
@@ -8395,55 +8482,8 @@
         </p:blipFill>
         <p:spPr bwMode="auto">
           <a:xfrm>
-            <a:off x="4121612" y="2816740"/>
-            <a:ext cx="2466975" cy="1847850"/>
-          </a:xfrm>
-          <a:prstGeom prst="rect">
-            <a:avLst/>
-          </a:prstGeom>
-          <a:noFill/>
-          <a:extLst>
-            <a:ext uri="{909E8E84-426E-40DD-AFC4-6F175D3DCCD1}">
-              <a14:hiddenFill xmlns:a14="http://schemas.microsoft.com/office/drawing/2010/main">
-                <a:solidFill>
-                  <a:srgbClr val="FFFFFF"/>
-                </a:solidFill>
-              </a14:hiddenFill>
-            </a:ext>
-          </a:extLst>
-        </p:spPr>
-      </p:pic>
-      <p:pic>
-        <p:nvPicPr>
-          <p:cNvPr id="5124" name="Picture 4" descr="1 - Wiktionary">
-            <a:extLst>
-              <a:ext uri="{FF2B5EF4-FFF2-40B4-BE49-F238E27FC236}">
-                <a16:creationId xmlns:a16="http://schemas.microsoft.com/office/drawing/2014/main" id="{32284EF6-C842-4AD5-A271-0FE8AA625492}"/>
-              </a:ext>
-            </a:extLst>
-          </p:cNvPr>
-          <p:cNvPicPr>
-            <a:picLocks noChangeAspect="1" noChangeArrowheads="1"/>
-          </p:cNvPicPr>
-          <p:nvPr/>
-        </p:nvPicPr>
-        <p:blipFill>
-          <a:blip r:embed="rId4">
-            <a:extLst>
-              <a:ext uri="{28A0092B-C50C-407E-A947-70E740481C1C}">
-                <a14:useLocalDpi xmlns:a14="http://schemas.microsoft.com/office/drawing/2010/main" val="0"/>
-              </a:ext>
-            </a:extLst>
-          </a:blip>
-          <a:srcRect/>
-          <a:stretch>
-            <a:fillRect/>
-          </a:stretch>
-        </p:blipFill>
-        <p:spPr bwMode="auto">
-          <a:xfrm>
-            <a:off x="6588587" y="2322224"/>
-            <a:ext cx="2143125" cy="2143125"/>
+            <a:off x="2927074" y="2218911"/>
+            <a:ext cx="3289852" cy="2467389"/>
           </a:xfrm>
           <a:prstGeom prst="rect">
             <a:avLst/>
@@ -8533,10 +8573,10 @@
               <a:buNone/>
             </a:pPr>
             <a:r>
-              <a:rPr lang="en"/>
+              <a:rPr lang="en" dirty="0"/>
               <a:t>Challenges Encountered</a:t>
             </a:r>
-            <a:endParaRPr/>
+            <a:endParaRPr dirty="0"/>
           </a:p>
         </p:txBody>
       </p:sp>
@@ -8584,8 +8624,29 @@
               </a:rPr>
               <a:t>model wasn’t without its challenges</a:t>
             </a:r>
+          </a:p>
+          <a:p>
+            <a:pPr marL="742950" lvl="1" indent="-285750"/>
             <a:r>
-              <a:rPr lang="en-US" sz="1800" b="0" i="0" u="none" strike="noStrike" baseline="0" dirty="0">
+              <a:rPr lang="en-US" b="0" i="0" u="none" strike="noStrike" baseline="0" dirty="0">
+                <a:solidFill>
+                  <a:srgbClr val="000000"/>
+                </a:solidFill>
+                <a:latin typeface="Arial" panose="020B0604020202020204" pitchFamily="34" charset="0"/>
+              </a:rPr>
+              <a:t>Ma</a:t>
+            </a:r>
+            <a:r>
+              <a:rPr lang="en-US" dirty="0">
+                <a:solidFill>
+                  <a:srgbClr val="000000"/>
+                </a:solidFill>
+                <a:latin typeface="Arial" panose="020B0604020202020204" pitchFamily="34" charset="0"/>
+              </a:rPr>
+              <a:t>ny models cycled before random forest</a:t>
+            </a:r>
+            <a:r>
+              <a:rPr lang="en-US" b="0" i="0" u="none" strike="noStrike" baseline="0" dirty="0">
                 <a:solidFill>
                   <a:srgbClr val="000000"/>
                 </a:solidFill>
@@ -8608,67 +8669,55 @@
           </a:p>
           <a:p>
             <a:pPr marL="742950" lvl="1" indent="-285750"/>
-            <a:r>
-              <a:rPr lang="en-US" dirty="0">
-                <a:solidFill>
-                  <a:srgbClr val="000000"/>
-                </a:solidFill>
-                <a:latin typeface="Arial" panose="020B0604020202020204" pitchFamily="34" charset="0"/>
-              </a:rPr>
-              <a:t>Too many features</a:t>
-            </a:r>
-          </a:p>
-          <a:p>
-            <a:pPr marL="742950" lvl="1" indent="-285750"/>
-            <a:r>
-              <a:rPr lang="en-US" dirty="0">
-                <a:solidFill>
-                  <a:srgbClr val="000000"/>
-                </a:solidFill>
-                <a:latin typeface="Arial" panose="020B0604020202020204" pitchFamily="34" charset="0"/>
-              </a:rPr>
-              <a:t>Assumptions vs reality</a:t>
-            </a:r>
             <a:endParaRPr dirty="0"/>
           </a:p>
         </p:txBody>
       </p:sp>
       <p:pic>
         <p:nvPicPr>
-          <p:cNvPr id="2" name="Audio 1">
-            <a:hlinkClick r:id="" action="ppaction://media"/>
+          <p:cNvPr id="4098" name="Picture 2" descr="cycle icon vector">
             <a:extLst>
               <a:ext uri="{FF2B5EF4-FFF2-40B4-BE49-F238E27FC236}">
-                <a16:creationId xmlns:a16="http://schemas.microsoft.com/office/drawing/2014/main" id="{C664B6D6-54F9-4E0B-998F-9B684D35AD67}"/>
+                <a16:creationId xmlns:a16="http://schemas.microsoft.com/office/drawing/2014/main" id="{157C92D7-0810-8BB5-B2C7-91F1CB554592}"/>
               </a:ext>
             </a:extLst>
           </p:cNvPr>
           <p:cNvPicPr>
-            <a:picLocks noChangeAspect="1"/>
+            <a:picLocks noChangeAspect="1" noChangeArrowheads="1"/>
           </p:cNvPicPr>
-          <p:nvPr>
-            <a:audioFile r:link="rId2"/>
-            <p:extLst>
-              <p:ext uri="{DAA4B4D4-6D71-4841-9C94-3DE7FCFB9230}">
-                <p14:media xmlns:p14="http://schemas.microsoft.com/office/powerpoint/2010/main" r:embed="rId1"/>
-              </p:ext>
-            </p:extLst>
-          </p:nvPr>
+          <p:nvPr/>
         </p:nvPicPr>
         <p:blipFill>
-          <a:blip r:embed="rId5"/>
+          <a:blip r:embed="rId3">
+            <a:extLst>
+              <a:ext uri="{28A0092B-C50C-407E-A947-70E740481C1C}">
+                <a14:useLocalDpi xmlns:a14="http://schemas.microsoft.com/office/drawing/2010/main" val="0"/>
+              </a:ext>
+            </a:extLst>
+          </a:blip>
+          <a:srcRect/>
           <a:stretch>
             <a:fillRect/>
           </a:stretch>
         </p:blipFill>
-        <p:spPr>
+        <p:spPr bwMode="auto">
           <a:xfrm>
-            <a:off x="8504238" y="4503738"/>
-            <a:ext cx="487362" cy="487362"/>
+            <a:off x="3417925" y="2455100"/>
+            <a:ext cx="2143125" cy="2143125"/>
           </a:xfrm>
           <a:prstGeom prst="rect">
             <a:avLst/>
           </a:prstGeom>
+          <a:noFill/>
+          <a:extLst>
+            <a:ext uri="{909E8E84-426E-40DD-AFC4-6F175D3DCCD1}">
+              <a14:hiddenFill xmlns:a14="http://schemas.microsoft.com/office/drawing/2010/main">
+                <a:solidFill>
+                  <a:srgbClr val="FFFFFF"/>
+                </a:solidFill>
+              </a14:hiddenFill>
+            </a:ext>
+          </a:extLst>
         </p:spPr>
       </p:pic>
     </p:spTree>
@@ -8684,93 +8733,6 @@
       <p:transition spd="slow" advTm="42618"/>
     </mc:Fallback>
   </mc:AlternateContent>
-  <p:timing>
-    <p:tnLst>
-      <p:par>
-        <p:cTn id="1" dur="indefinite" restart="never" nodeType="tmRoot">
-          <p:childTnLst>
-            <p:seq concurrent="1" nextAc="seek">
-              <p:cTn id="2" dur="indefinite" nodeType="mainSeq">
-                <p:childTnLst>
-                  <p:par>
-                    <p:cTn id="3" fill="hold">
-                      <p:stCondLst>
-                        <p:cond delay="indefinite"/>
-                        <p:cond evt="onBegin" delay="0">
-                          <p:tn val="2"/>
-                        </p:cond>
-                      </p:stCondLst>
-                      <p:childTnLst>
-                        <p:par>
-                          <p:cTn id="4" fill="hold">
-                            <p:stCondLst>
-                              <p:cond delay="0"/>
-                            </p:stCondLst>
-                            <p:childTnLst>
-                              <p:par>
-                                <p:cTn id="5" presetID="1" presetClass="mediacall" presetSubtype="0" fill="hold" nodeType="afterEffect">
-                                  <p:stCondLst>
-                                    <p:cond delay="0"/>
-                                  </p:stCondLst>
-                                  <p:childTnLst>
-                                    <p:cmd type="call" cmd="playFrom(0.0)">
-                                      <p:cBhvr>
-                                        <p:cTn id="6" dur="1" fill="hold"/>
-                                        <p:tgtEl>
-                                          <p:spTgt spid="2"/>
-                                        </p:tgtEl>
-                                      </p:cBhvr>
-                                    </p:cmd>
-                                  </p:childTnLst>
-                                </p:cTn>
-                              </p:par>
-                            </p:childTnLst>
-                          </p:cTn>
-                        </p:par>
-                      </p:childTnLst>
-                    </p:cTn>
-                  </p:par>
-                </p:childTnLst>
-              </p:cTn>
-              <p:prevCondLst>
-                <p:cond evt="onPrev" delay="0">
-                  <p:tgtEl>
-                    <p:sldTgt/>
-                  </p:tgtEl>
-                </p:cond>
-              </p:prevCondLst>
-              <p:nextCondLst>
-                <p:cond evt="onNext" delay="0">
-                  <p:tgtEl>
-                    <p:sldTgt/>
-                  </p:tgtEl>
-                </p:cond>
-              </p:nextCondLst>
-            </p:seq>
-            <p:audio isNarration="1">
-              <p:cMediaNode vol="80000" showWhenStopped="0">
-                <p:cTn id="7" fill="hold" display="0">
-                  <p:stCondLst>
-                    <p:cond delay="indefinite"/>
-                  </p:stCondLst>
-                  <p:endCondLst>
-                    <p:cond evt="onStopAudio" delay="0">
-                      <p:tgtEl>
-                        <p:sldTgt/>
-                      </p:tgtEl>
-                    </p:cond>
-                  </p:endCondLst>
-                </p:cTn>
-                <p:tgtEl>
-                  <p:spTgt spid="2"/>
-                </p:tgtEl>
-              </p:cMediaNode>
-            </p:audio>
-          </p:childTnLst>
-        </p:cTn>
-      </p:par>
-    </p:tnLst>
-  </p:timing>
 </p:sld>
 </file>
 
@@ -8845,7 +8807,7 @@
         </p:nvSpPr>
         <p:spPr>
           <a:xfrm>
-            <a:off x="2400250" y="1026623"/>
+            <a:off x="2471650" y="1145892"/>
             <a:ext cx="6250200" cy="3835800"/>
           </a:xfrm>
           <a:prstGeom prst="rect">
@@ -8941,10 +8903,10 @@
       </p:sp>
       <p:pic>
         <p:nvPicPr>
-          <p:cNvPr id="1026" name="Picture 2" descr="Free TV Cliparts, Download Free TV Cliparts png images, Free ClipArts on  Clipart Library">
+          <p:cNvPr id="9" name="Picture 2">
             <a:extLst>
               <a:ext uri="{FF2B5EF4-FFF2-40B4-BE49-F238E27FC236}">
-                <a16:creationId xmlns:a16="http://schemas.microsoft.com/office/drawing/2014/main" id="{38856BCC-B06F-4EFE-8810-67A70C631705}"/>
+                <a16:creationId xmlns:a16="http://schemas.microsoft.com/office/drawing/2014/main" id="{05AE4B86-38E0-E67E-5F9D-A5A16EA2FACD}"/>
               </a:ext>
             </a:extLst>
           </p:cNvPr>
@@ -8954,7 +8916,7 @@
           <p:nvPr/>
         </p:nvPicPr>
         <p:blipFill>
-          <a:blip r:embed="rId5">
+          <a:blip r:embed="rId3">
             <a:extLst>
               <a:ext uri="{28A0092B-C50C-407E-A947-70E740481C1C}">
                 <a14:useLocalDpi xmlns:a14="http://schemas.microsoft.com/office/drawing/2010/main" val="0"/>
@@ -8968,8 +8930,8 @@
         </p:blipFill>
         <p:spPr bwMode="auto">
           <a:xfrm>
-            <a:off x="2590366" y="1647825"/>
-            <a:ext cx="2466975" cy="1847850"/>
+            <a:off x="5770588" y="1701779"/>
+            <a:ext cx="2951262" cy="2951262"/>
           </a:xfrm>
           <a:prstGeom prst="rect">
             <a:avLst/>
@@ -8988,10 +8950,10 @@
       </p:pic>
       <p:pic>
         <p:nvPicPr>
-          <p:cNvPr id="1032" name="Picture 8" descr="Simple Video Game Controller Clip Art, Controller Clipart, Video Game,  Creative Handle PNG Transparent Clipart Image and PSD File for Free Download">
+          <p:cNvPr id="5124" name="Picture 4" descr="The Ultimate Guide to Digital Marketing">
             <a:extLst>
               <a:ext uri="{FF2B5EF4-FFF2-40B4-BE49-F238E27FC236}">
-                <a16:creationId xmlns:a16="http://schemas.microsoft.com/office/drawing/2014/main" id="{F0F0D90C-8E6D-4CAA-A360-31327C28A9DD}"/>
+                <a16:creationId xmlns:a16="http://schemas.microsoft.com/office/drawing/2014/main" id="{A3606F5B-348C-06B6-1711-8895646E32B2}"/>
               </a:ext>
             </a:extLst>
           </p:cNvPr>
@@ -9001,7 +8963,7 @@
           <p:nvPr/>
         </p:nvPicPr>
         <p:blipFill>
-          <a:blip r:embed="rId6">
+          <a:blip r:embed="rId4">
             <a:extLst>
               <a:ext uri="{28A0092B-C50C-407E-A947-70E740481C1C}">
                 <a14:useLocalDpi xmlns:a14="http://schemas.microsoft.com/office/drawing/2010/main" val="0"/>
@@ -9015,8 +8977,8 @@
         </p:blipFill>
         <p:spPr bwMode="auto">
           <a:xfrm>
-            <a:off x="7029018" y="1647824"/>
-            <a:ext cx="2050327" cy="2050327"/>
+            <a:off x="860658" y="1989837"/>
+            <a:ext cx="4909930" cy="2577713"/>
           </a:xfrm>
           <a:prstGeom prst="rect">
             <a:avLst/>
@@ -9031,91 +8993,6 @@
               </a14:hiddenFill>
             </a:ext>
           </a:extLst>
-        </p:spPr>
-      </p:pic>
-      <p:pic>
-        <p:nvPicPr>
-          <p:cNvPr id="1034" name="Picture 10" descr="1,946,822 Music Stock Photos, Pictures &amp; Royalty-Free Images - iStock">
-            <a:extLst>
-              <a:ext uri="{FF2B5EF4-FFF2-40B4-BE49-F238E27FC236}">
-                <a16:creationId xmlns:a16="http://schemas.microsoft.com/office/drawing/2014/main" id="{17124BAD-E500-40F7-B17F-DB92F0C7DCBA}"/>
-              </a:ext>
-            </a:extLst>
-          </p:cNvPr>
-          <p:cNvPicPr>
-            <a:picLocks noChangeAspect="1" noChangeArrowheads="1"/>
-          </p:cNvPicPr>
-          <p:nvPr/>
-        </p:nvPicPr>
-        <p:blipFill>
-          <a:blip r:embed="rId7">
-            <a:extLst>
-              <a:ext uri="{28A0092B-C50C-407E-A947-70E740481C1C}">
-                <a14:useLocalDpi xmlns:a14="http://schemas.microsoft.com/office/drawing/2010/main" val="0"/>
-              </a:ext>
-            </a:extLst>
-          </a:blip>
-          <a:srcRect/>
-          <a:stretch>
-            <a:fillRect/>
-          </a:stretch>
-        </p:blipFill>
-        <p:spPr bwMode="auto">
-          <a:xfrm>
-            <a:off x="4885893" y="1647825"/>
-            <a:ext cx="2143125" cy="2143125"/>
-          </a:xfrm>
-          <a:prstGeom prst="rect">
-            <a:avLst/>
-          </a:prstGeom>
-          <a:noFill/>
-          <a:extLst>
-            <a:ext uri="{909E8E84-426E-40DD-AFC4-6F175D3DCCD1}">
-              <a14:hiddenFill xmlns:a14="http://schemas.microsoft.com/office/drawing/2010/main">
-                <a:solidFill>
-                  <a:srgbClr val="FFFFFF"/>
-                </a:solidFill>
-              </a14:hiddenFill>
-            </a:ext>
-          </a:extLst>
-        </p:spPr>
-      </p:pic>
-      <p:pic>
-        <p:nvPicPr>
-          <p:cNvPr id="2" name="Audio 1">
-            <a:hlinkClick r:id="" action="ppaction://media"/>
-            <a:extLst>
-              <a:ext uri="{FF2B5EF4-FFF2-40B4-BE49-F238E27FC236}">
-                <a16:creationId xmlns:a16="http://schemas.microsoft.com/office/drawing/2014/main" id="{16349826-414B-4A26-905E-865B8A9239BA}"/>
-              </a:ext>
-            </a:extLst>
-          </p:cNvPr>
-          <p:cNvPicPr>
-            <a:picLocks noChangeAspect="1"/>
-          </p:cNvPicPr>
-          <p:nvPr>
-            <a:audioFile r:link="rId2"/>
-            <p:extLst>
-              <p:ext uri="{DAA4B4D4-6D71-4841-9C94-3DE7FCFB9230}">
-                <p14:media xmlns:p14="http://schemas.microsoft.com/office/powerpoint/2010/main" r:embed="rId1"/>
-              </p:ext>
-            </p:extLst>
-          </p:nvPr>
-        </p:nvPicPr>
-        <p:blipFill>
-          <a:blip r:embed="rId8"/>
-          <a:stretch>
-            <a:fillRect/>
-          </a:stretch>
-        </p:blipFill>
-        <p:spPr>
-          <a:xfrm>
-            <a:off x="8504238" y="4503738"/>
-            <a:ext cx="487362" cy="487362"/>
-          </a:xfrm>
-          <a:prstGeom prst="rect">
-            <a:avLst/>
-          </a:prstGeom>
         </p:spPr>
       </p:pic>
     </p:spTree>
@@ -9131,93 +9008,6 @@
       <p:transition spd="slow" advTm="45962"/>
     </mc:Fallback>
   </mc:AlternateContent>
-  <p:timing>
-    <p:tnLst>
-      <p:par>
-        <p:cTn id="1" dur="indefinite" restart="never" nodeType="tmRoot">
-          <p:childTnLst>
-            <p:seq concurrent="1" nextAc="seek">
-              <p:cTn id="2" dur="indefinite" nodeType="mainSeq">
-                <p:childTnLst>
-                  <p:par>
-                    <p:cTn id="3" fill="hold">
-                      <p:stCondLst>
-                        <p:cond delay="indefinite"/>
-                        <p:cond evt="onBegin" delay="0">
-                          <p:tn val="2"/>
-                        </p:cond>
-                      </p:stCondLst>
-                      <p:childTnLst>
-                        <p:par>
-                          <p:cTn id="4" fill="hold">
-                            <p:stCondLst>
-                              <p:cond delay="0"/>
-                            </p:stCondLst>
-                            <p:childTnLst>
-                              <p:par>
-                                <p:cTn id="5" presetID="1" presetClass="mediacall" presetSubtype="0" fill="hold" nodeType="afterEffect">
-                                  <p:stCondLst>
-                                    <p:cond delay="0"/>
-                                  </p:stCondLst>
-                                  <p:childTnLst>
-                                    <p:cmd type="call" cmd="playFrom(0.0)">
-                                      <p:cBhvr>
-                                        <p:cTn id="6" dur="1" fill="hold"/>
-                                        <p:tgtEl>
-                                          <p:spTgt spid="2"/>
-                                        </p:tgtEl>
-                                      </p:cBhvr>
-                                    </p:cmd>
-                                  </p:childTnLst>
-                                </p:cTn>
-                              </p:par>
-                            </p:childTnLst>
-                          </p:cTn>
-                        </p:par>
-                      </p:childTnLst>
-                    </p:cTn>
-                  </p:par>
-                </p:childTnLst>
-              </p:cTn>
-              <p:prevCondLst>
-                <p:cond evt="onPrev" delay="0">
-                  <p:tgtEl>
-                    <p:sldTgt/>
-                  </p:tgtEl>
-                </p:cond>
-              </p:prevCondLst>
-              <p:nextCondLst>
-                <p:cond evt="onNext" delay="0">
-                  <p:tgtEl>
-                    <p:sldTgt/>
-                  </p:tgtEl>
-                </p:cond>
-              </p:nextCondLst>
-            </p:seq>
-            <p:audio isNarration="1">
-              <p:cMediaNode vol="80000" showWhenStopped="0">
-                <p:cTn id="7" fill="hold" display="0">
-                  <p:stCondLst>
-                    <p:cond delay="indefinite"/>
-                  </p:stCondLst>
-                  <p:endCondLst>
-                    <p:cond evt="onStopAudio" delay="0">
-                      <p:tgtEl>
-                        <p:sldTgt/>
-                      </p:tgtEl>
-                    </p:cond>
-                  </p:endCondLst>
-                </p:cTn>
-                <p:tgtEl>
-                  <p:spTgt spid="2"/>
-                </p:tgtEl>
-              </p:cMediaNode>
-            </p:audio>
-          </p:childTnLst>
-        </p:cTn>
-      </p:par>
-    </p:tnLst>
-  </p:timing>
 </p:sld>
 </file>
 
@@ -9287,163 +9077,175 @@
         <p:spPr>
           <a:xfrm>
             <a:off x="1320800" y="1290975"/>
-            <a:ext cx="7734185" cy="2971775"/>
+            <a:ext cx="7734185" cy="3276575"/>
           </a:xfrm>
         </p:spPr>
         <p:txBody>
           <a:bodyPr>
-            <a:normAutofit fontScale="25000" lnSpcReduction="20000"/>
+            <a:normAutofit fontScale="85000" lnSpcReduction="10000"/>
           </a:bodyPr>
           <a:lstStyle/>
           <a:p>
-            <a:pPr marL="1028700" indent="-914400">
-              <a:buFont typeface="+mj-lt"/>
+            <a:pPr>
+              <a:buFont typeface="Lato"/>
               <a:buAutoNum type="arabicPeriod"/>
             </a:pPr>
             <a:r>
-              <a:rPr lang="en-US" sz="5500" b="0" i="0" u="none" strike="noStrike" baseline="0" dirty="0">
+              <a:rPr lang="en-US" sz="1800" b="0" i="0" u="none" strike="noStrike" baseline="0" dirty="0">
                 <a:solidFill>
                   <a:srgbClr val="000000"/>
                 </a:solidFill>
                 <a:latin typeface="Arial" panose="020B0604020202020204" pitchFamily="34" charset="0"/>
               </a:rPr>
-              <a:t>Why was a random forest model chosen over linear regression? </a:t>
+              <a:t>When testing the different models, were there any others that could be tested? </a:t>
             </a:r>
           </a:p>
           <a:p>
-            <a:pPr marL="1028700" indent="-914400">
-              <a:buFont typeface="+mj-lt"/>
+            <a:pPr>
+              <a:buFont typeface="Lato"/>
               <a:buAutoNum type="arabicPeriod"/>
             </a:pPr>
             <a:r>
-              <a:rPr lang="en-US" sz="5500" b="0" i="0" u="none" strike="noStrike" baseline="0" dirty="0">
+              <a:rPr lang="en-US" sz="1800" b="0" i="0" u="none" strike="noStrike" baseline="0" dirty="0">
                 <a:solidFill>
                   <a:srgbClr val="000000"/>
                 </a:solidFill>
                 <a:latin typeface="Arial" panose="020B0604020202020204" pitchFamily="34" charset="0"/>
               </a:rPr>
-              <a:t>Would a similar algorithm have any application outside the entertainment sector? </a:t>
+              <a:t>On a larger data scale, is there enough computing power for hospital data? </a:t>
             </a:r>
           </a:p>
           <a:p>
-            <a:pPr marL="1028700" indent="-914400">
-              <a:buFont typeface="+mj-lt"/>
+            <a:pPr>
+              <a:buFont typeface="Lato"/>
               <a:buAutoNum type="arabicPeriod"/>
             </a:pPr>
             <a:r>
-              <a:rPr lang="en-US" sz="5500" b="0" i="0" u="none" strike="noStrike" baseline="0" dirty="0">
+              <a:rPr lang="en-US" sz="1800" b="0" i="0" u="none" strike="noStrike" baseline="0" dirty="0">
                 <a:solidFill>
                   <a:srgbClr val="000000"/>
                 </a:solidFill>
                 <a:latin typeface="Arial" panose="020B0604020202020204" pitchFamily="34" charset="0"/>
               </a:rPr>
-              <a:t>Is the assumption that &lt;1 is a safe error value founded on previous projects? </a:t>
+              <a:t>Are there other ways of optimizing runtimes besides more computing power?</a:t>
             </a:r>
           </a:p>
           <a:p>
-            <a:pPr marL="1028700" indent="-914400">
-              <a:buFont typeface="+mj-lt"/>
+            <a:pPr>
+              <a:buFont typeface="Lato"/>
               <a:buAutoNum type="arabicPeriod"/>
             </a:pPr>
             <a:r>
-              <a:rPr lang="en-US" sz="5500" b="0" i="0" u="none" strike="noStrike" baseline="0" dirty="0">
+              <a:rPr lang="en-US" sz="1800" b="0" i="0" u="none" strike="noStrike" baseline="0" dirty="0">
                 <a:solidFill>
                   <a:srgbClr val="000000"/>
                 </a:solidFill>
                 <a:latin typeface="Arial" panose="020B0604020202020204" pitchFamily="34" charset="0"/>
               </a:rPr>
-              <a:t>What is the plan to resolve the ethical issue mentioned earlier? </a:t>
+              <a:t>If heart disease is multiple diseases, could the model predict which disease a patient would develop in addition to a Yes/No answer?</a:t>
             </a:r>
           </a:p>
           <a:p>
-            <a:pPr marL="1028700" indent="-914400">
-              <a:buFont typeface="+mj-lt"/>
+            <a:pPr>
+              <a:buFont typeface="Lato"/>
               <a:buAutoNum type="arabicPeriod"/>
             </a:pPr>
             <a:r>
-              <a:rPr lang="en-US" sz="5500" b="0" i="0" u="none" strike="noStrike" baseline="0" dirty="0">
+              <a:rPr lang="en-US" sz="1800" b="0" i="0" u="none" strike="noStrike" baseline="0" dirty="0">
                 <a:solidFill>
                   <a:srgbClr val="000000"/>
                 </a:solidFill>
                 <a:latin typeface="Arial" panose="020B0604020202020204" pitchFamily="34" charset="0"/>
               </a:rPr>
-              <a:t>How would changing trends be accounted for if the model was deployed today? </a:t>
+              <a:t>The diseases that make up the heart disease umbrella are mentioned to have “similar risk factors” but are they similar enough that one model can predict all? </a:t>
             </a:r>
           </a:p>
           <a:p>
-            <a:pPr marL="1028700" indent="-914400">
-              <a:buFont typeface="+mj-lt"/>
+            <a:pPr>
+              <a:buFont typeface="Lato"/>
               <a:buAutoNum type="arabicPeriod"/>
             </a:pPr>
             <a:r>
-              <a:rPr lang="en-US" sz="5500" b="0" i="0" u="none" strike="noStrike" baseline="0" dirty="0">
+              <a:rPr lang="en-US" sz="1800" b="0" i="0" u="none" strike="noStrike" baseline="0" dirty="0">
                 <a:solidFill>
                   <a:srgbClr val="000000"/>
                 </a:solidFill>
                 <a:latin typeface="Arial" panose="020B0604020202020204" pitchFamily="34" charset="0"/>
               </a:rPr>
-              <a:t>On a larger data scale, how would the aforementioned power issue be resolved? </a:t>
+              <a:t>Will this model work for predicting other diseases with similar risk factors?</a:t>
             </a:r>
           </a:p>
           <a:p>
-            <a:pPr marL="1028700" indent="-914400">
-              <a:buFont typeface="+mj-lt"/>
+            <a:pPr>
+              <a:buFont typeface="Lato"/>
               <a:buAutoNum type="arabicPeriod"/>
             </a:pPr>
             <a:r>
-              <a:rPr lang="en-US" sz="5500" b="0" i="0" u="none" strike="noStrike" baseline="0" dirty="0">
+              <a:rPr lang="en-US" sz="1800" b="0" i="0" u="none" strike="noStrike" baseline="0" dirty="0">
                 <a:solidFill>
                   <a:srgbClr val="000000"/>
                 </a:solidFill>
                 <a:latin typeface="Arial" panose="020B0604020202020204" pitchFamily="34" charset="0"/>
               </a:rPr>
-              <a:t>What types of biases would correlated features introduce in your model? </a:t>
+              <a:t>Would hyperparameter tuning have affected the values of the scoring metrics?</a:t>
             </a:r>
           </a:p>
           <a:p>
-            <a:pPr marL="1028700" indent="-914400">
-              <a:buFont typeface="+mj-lt"/>
+            <a:pPr>
+              <a:buFont typeface="Lato"/>
               <a:buAutoNum type="arabicPeriod"/>
             </a:pPr>
             <a:r>
-              <a:rPr lang="en-US" sz="5500" b="0" i="0" u="none" strike="noStrike" baseline="0" dirty="0">
+              <a:rPr lang="en-US" sz="1800" b="0" i="0" u="none" strike="noStrike" baseline="0" dirty="0">
                 <a:solidFill>
                   <a:srgbClr val="000000"/>
                 </a:solidFill>
                 <a:latin typeface="Arial" panose="020B0604020202020204" pitchFamily="34" charset="0"/>
               </a:rPr>
-              <a:t>Could such a model be implemented using other programming languages? </a:t>
+              <a:t>What other future uses are there for this model besides for cell phone providers? </a:t>
             </a:r>
           </a:p>
           <a:p>
-            <a:pPr marL="1028700" indent="-914400">
-              <a:buFont typeface="+mj-lt"/>
+            <a:pPr>
+              <a:buFont typeface="Lato"/>
               <a:buAutoNum type="arabicPeriod"/>
             </a:pPr>
             <a:r>
-              <a:rPr lang="en-US" sz="5500" b="0" i="0" u="none" strike="noStrike" baseline="0" dirty="0">
+              <a:rPr lang="en-US" sz="1800" b="0" i="0" u="none" strike="noStrike" baseline="0" dirty="0">
                 <a:solidFill>
                   <a:srgbClr val="000000"/>
                 </a:solidFill>
                 <a:latin typeface="Arial" panose="020B0604020202020204" pitchFamily="34" charset="0"/>
               </a:rPr>
-              <a:t>What hyperparameters could have been tuned in this model? </a:t>
+              <a:t>Why was over-sampling chosen over under-sampling to balance the classes? </a:t>
             </a:r>
           </a:p>
           <a:p>
-            <a:pPr marL="1028700" indent="-914400">
-              <a:buFont typeface="+mj-lt"/>
+            <a:pPr>
+              <a:buFont typeface="Lato"/>
               <a:buAutoNum type="arabicPeriod"/>
             </a:pPr>
             <a:r>
-              <a:rPr lang="en-US" sz="5500" b="0" i="0" u="none" strike="noStrike" baseline="0" dirty="0">
+              <a:rPr lang="en-US" sz="1800" b="0" i="0" u="none" strike="noStrike" baseline="0" dirty="0">
                 <a:solidFill>
                   <a:srgbClr val="000000"/>
                 </a:solidFill>
                 <a:latin typeface="Arial" panose="020B0604020202020204" pitchFamily="34" charset="0"/>
               </a:rPr>
-              <a:t>Were there any other important features that weren’t included in the dataset? </a:t>
+              <a:t>How can insurance companies be prevented from abusing this model? </a:t>
             </a:r>
+          </a:p>
+          <a:p>
+            <a:pPr>
+              <a:buFont typeface="Lato"/>
+              <a:buAutoNum type="arabicPeriod"/>
+            </a:pPr>
+            <a:endParaRPr lang="en-US" dirty="0">
+              <a:solidFill>
+                <a:srgbClr val="000000"/>
+              </a:solidFill>
+              <a:latin typeface="Arial" panose="020B0604020202020204" pitchFamily="34" charset="0"/>
+            </a:endParaRPr>
           </a:p>
           <a:p>
             <a:endParaRPr lang="en-US" dirty="0"/>
@@ -9541,8 +9343,8 @@
         </p:nvSpPr>
         <p:spPr>
           <a:xfrm>
-            <a:off x="240145" y="793173"/>
-            <a:ext cx="8839200" cy="4350327"/>
+            <a:off x="152400" y="936505"/>
+            <a:ext cx="8839200" cy="3778827"/>
           </a:xfrm>
         </p:spPr>
         <p:txBody>
@@ -9555,20 +9357,33 @@
               <a:buNone/>
             </a:pPr>
             <a:r>
-              <a:rPr lang="en-US" sz="1200" b="0" i="0" u="none" strike="noStrike" baseline="0" dirty="0">
+              <a:rPr lang="en-US" sz="1400" b="0" i="0" u="none" strike="noStrike" baseline="0" dirty="0">
                 <a:solidFill>
                   <a:srgbClr val="000000"/>
                 </a:solidFill>
                 <a:latin typeface="Arial" panose="020B0604020202020204" pitchFamily="34" charset="0"/>
               </a:rPr>
-              <a:t>Chakraborty, P., Rahman, S., &amp; Zahid, Z. (2019). Movie Success Prediction using Historical and Current Data Mining. International Journal of Computer Applications. Retrieved on April 3, 2022 from https://www.researchgate.net/publication/335878983_Movie_Success_Prediction_using_Historical_and_Current_Data_Mining#:~:text=Identifying%20the%20right%20factors%20can,views%2C%20trailer%20views%20etc... </a:t>
+              <a:t>Allen, M. (2018). </a:t>
             </a:r>
-          </a:p>
-          <a:p>
-            <a:pPr marL="114300" indent="0">
-              <a:buNone/>
-            </a:pPr>
-            <a:endParaRPr lang="en-US" sz="1200" b="0" i="0" u="none" strike="noStrike" baseline="0" dirty="0">
+            <a:r>
+              <a:rPr lang="en-US" sz="1400" b="0" i="1" u="none" strike="noStrike" baseline="0" dirty="0">
+                <a:solidFill>
+                  <a:srgbClr val="000000"/>
+                </a:solidFill>
+                <a:latin typeface="Arial" panose="020B0604020202020204" pitchFamily="34" charset="0"/>
+              </a:rPr>
+              <a:t>Health Insurers and Vacuuming Up Details About You – And It Could Raise Your Rates. </a:t>
+            </a:r>
+            <a:r>
+              <a:rPr lang="en-US" sz="1400" b="0" i="0" u="none" strike="noStrike" baseline="0" dirty="0">
+                <a:solidFill>
+                  <a:srgbClr val="000000"/>
+                </a:solidFill>
+                <a:latin typeface="Arial" panose="020B0604020202020204" pitchFamily="34" charset="0"/>
+              </a:rPr>
+              <a:t>ProPublica. Retrieved on April 30, 2022 from https://www.propublica.org/article/health-insurers-are-vacuuming-up-details-about-you-and-it-could-raise-your-rates. </a:t>
+            </a:r>
+            <a:endParaRPr lang="en-US" sz="1400" dirty="0">
               <a:solidFill>
                 <a:srgbClr val="000000"/>
               </a:solidFill>
@@ -9579,35 +9394,7 @@
             <a:pPr marL="114300" indent="0">
               <a:buNone/>
             </a:pPr>
-            <a:r>
-              <a:rPr lang="en-US" sz="1200" b="0" i="0" u="none" strike="noStrike" baseline="0" dirty="0">
-                <a:solidFill>
-                  <a:srgbClr val="000000"/>
-                </a:solidFill>
-                <a:latin typeface="Arial" panose="020B0604020202020204" pitchFamily="34" charset="0"/>
-              </a:rPr>
-              <a:t>Gleeson, P. P. D. (2018). Statistics on People Getting Famous in Acting. Work - Chron.com. Retrieved on April 3, 2022 from https://work.chron.com/statistics-people-getting-famous-acting-23946.html. </a:t>
-            </a:r>
-          </a:p>
-          <a:p>
-            <a:pPr marL="114300" indent="0">
-              <a:buNone/>
-            </a:pPr>
-            <a:r>
-              <a:rPr lang="en-US" sz="1200" b="0" i="0" u="none" strike="noStrike" baseline="0" dirty="0">
-                <a:solidFill>
-                  <a:srgbClr val="000000"/>
-                </a:solidFill>
-                <a:latin typeface="Arial" panose="020B0604020202020204" pitchFamily="34" charset="0"/>
-              </a:rPr>
-              <a:t>Mayo, A. (2021). Hollywood is losing out on $10 billion in revenue every year by underfunding work by Black creators. Business Insider. Retrieved on April 3, 2022 from https://www.businessinsider.com/hollywood-could-boost-revenue-by-10-billion-2021-3. </a:t>
-            </a:r>
-          </a:p>
-          <a:p>
-            <a:pPr marL="114300" indent="0">
-              <a:buNone/>
-            </a:pPr>
-            <a:endParaRPr lang="en-US" sz="1200" b="0" i="0" u="none" strike="noStrike" baseline="0" dirty="0">
+            <a:endParaRPr lang="en-US" sz="1400" b="0" i="0" u="none" strike="noStrike" baseline="0" dirty="0">
               <a:solidFill>
                 <a:srgbClr val="000000"/>
               </a:solidFill>
@@ -9619,20 +9406,38 @@
               <a:buNone/>
             </a:pPr>
             <a:r>
-              <a:rPr lang="en-US" sz="1200" b="0" i="0" u="none" strike="noStrike" baseline="0" dirty="0">
+              <a:rPr lang="en-US" sz="1400" b="0" i="0" u="none" strike="noStrike" baseline="0" dirty="0">
                 <a:solidFill>
                   <a:srgbClr val="000000"/>
                 </a:solidFill>
                 <a:latin typeface="Arial" panose="020B0604020202020204" pitchFamily="34" charset="0"/>
               </a:rPr>
-              <a:t>Raj, A. (2020). A Quick and Dirty Guide to Random Forest Regression. Towards Data Science. Retrieved on April 3, 2022 from https://towardsdatascience.com/a-quick-and-dirty-guide-to-random-forest-regression-52ca0af157f8. </a:t>
+              <a:t>Beckerman, J. (2021). </a:t>
             </a:r>
+            <a:r>
+              <a:rPr lang="en-US" sz="1400" b="0" i="1" u="none" strike="noStrike" baseline="0" dirty="0">
+                <a:solidFill>
+                  <a:srgbClr val="000000"/>
+                </a:solidFill>
+                <a:latin typeface="Arial" panose="020B0604020202020204" pitchFamily="34" charset="0"/>
+              </a:rPr>
+              <a:t>Heart Disease: Types, Causes, and Symptoms. </a:t>
+            </a:r>
+            <a:r>
+              <a:rPr lang="en-US" sz="1400" b="0" i="0" u="none" strike="noStrike" baseline="0" dirty="0">
+                <a:solidFill>
+                  <a:srgbClr val="000000"/>
+                </a:solidFill>
+                <a:latin typeface="Arial" panose="020B0604020202020204" pitchFamily="34" charset="0"/>
+              </a:rPr>
+              <a:t>WebMD. Retrieved on April 30, 2022 from https://www.webmd.com/heart-disease/heart-disease-types-causes-symptoms. </a:t>
+            </a:r>
           </a:p>
           <a:p>
             <a:pPr marL="114300" indent="0">
               <a:buNone/>
             </a:pPr>
-            <a:endParaRPr lang="en-US" sz="1200" b="0" i="0" u="none" strike="noStrike" baseline="0" dirty="0">
+            <a:endParaRPr lang="en-US" sz="1400" b="0" i="0" u="none" strike="noStrike" baseline="0" dirty="0">
               <a:solidFill>
                 <a:srgbClr val="000000"/>
               </a:solidFill>
@@ -9644,43 +9449,56 @@
               <a:buNone/>
             </a:pPr>
             <a:r>
-              <a:rPr lang="en-US" sz="1200" b="0" i="0" u="none" strike="noStrike" baseline="0" dirty="0" err="1">
+              <a:rPr lang="en-US" sz="1400" b="0" i="0" u="none" strike="noStrike" baseline="0" dirty="0" err="1">
                 <a:solidFill>
                   <a:srgbClr val="000000"/>
                 </a:solidFill>
                 <a:latin typeface="Arial" panose="020B0604020202020204" pitchFamily="34" charset="0"/>
               </a:rPr>
-              <a:t>Sakoui</a:t>
+              <a:t>Karabiber</a:t>
             </a:r>
             <a:r>
-              <a:rPr lang="en-US" sz="1200" b="0" i="0" u="none" strike="noStrike" baseline="0" dirty="0">
+              <a:rPr lang="en-US" sz="1400" b="0" i="0" u="none" strike="noStrike" baseline="0" dirty="0">
                 <a:solidFill>
                   <a:srgbClr val="000000"/>
                 </a:solidFill>
                 <a:latin typeface="Arial" panose="020B0604020202020204" pitchFamily="34" charset="0"/>
               </a:rPr>
-              <a:t>, A. (2019). Hollywood Employs More Workers Than Mining and </a:t>
+              <a:t>, F. (2022). </a:t>
             </a:r>
-          </a:p>
-          <a:p>
-            <a:pPr marL="114300" indent="0">
-              <a:buNone/>
-            </a:pPr>
             <a:r>
-              <a:rPr lang="en-US" sz="1200" b="0" i="0" u="none" strike="noStrike" baseline="0" dirty="0">
+              <a:rPr lang="en-US" sz="1400" b="0" i="1" u="none" strike="noStrike" baseline="0" dirty="0">
                 <a:solidFill>
                   <a:srgbClr val="000000"/>
                 </a:solidFill>
                 <a:latin typeface="Arial" panose="020B0604020202020204" pitchFamily="34" charset="0"/>
               </a:rPr>
-              <a:t>Farming, MPAA Says. Bloomberg. Retrieved on April 3, 2022 from https://www.bloomberg.com/news/articles/2019-03-18/hollywood-tops-mining-crop-production-in-employment-mpaa-says. </a:t>
+              <a:t>Binary Classification. </a:t>
             </a:r>
+            <a:r>
+              <a:rPr lang="en-US" sz="1400" b="0" i="0" u="none" strike="noStrike" baseline="0" dirty="0" err="1">
+                <a:solidFill>
+                  <a:srgbClr val="000000"/>
+                </a:solidFill>
+                <a:latin typeface="Arial" panose="020B0604020202020204" pitchFamily="34" charset="0"/>
+              </a:rPr>
+              <a:t>LearnDataSci</a:t>
+            </a:r>
+            <a:r>
+              <a:rPr lang="en-US" sz="1400" b="0" i="0" u="none" strike="noStrike" baseline="0" dirty="0">
+                <a:solidFill>
+                  <a:srgbClr val="000000"/>
+                </a:solidFill>
+                <a:latin typeface="Arial" panose="020B0604020202020204" pitchFamily="34" charset="0"/>
+              </a:rPr>
+              <a:t>. Retrieved on April 30, 2022 from https://www.learndatasci.com/glossary/binary-classification/. </a:t>
+            </a:r>
           </a:p>
           <a:p>
             <a:pPr marL="114300" indent="0">
               <a:buNone/>
             </a:pPr>
-            <a:endParaRPr lang="en-US" sz="1200" b="0" i="0" u="none" strike="noStrike" baseline="0" dirty="0">
+            <a:endParaRPr lang="en-US" sz="1400" b="0" i="0" u="none" strike="noStrike" baseline="0" dirty="0">
               <a:solidFill>
                 <a:srgbClr val="000000"/>
               </a:solidFill>
@@ -9692,15 +9510,42 @@
               <a:buNone/>
             </a:pPr>
             <a:r>
-              <a:rPr lang="en-US" sz="1200" b="0" i="0" u="none" strike="noStrike" baseline="0" dirty="0">
+              <a:rPr lang="en-US" sz="1400" b="0" i="0" u="none" strike="noStrike" baseline="0" dirty="0" err="1">
                 <a:solidFill>
                   <a:srgbClr val="000000"/>
                 </a:solidFill>
                 <a:latin typeface="Arial" panose="020B0604020202020204" pitchFamily="34" charset="0"/>
               </a:rPr>
-              <a:t>Watson, A. (2020). Film Industry - statistics &amp; facts. Statista. Retrieved on April 3, 2022 from https://www.statista.com/topics/964/film/. </a:t>
+              <a:t>Koehrsen</a:t>
             </a:r>
-            <a:endParaRPr lang="en-US" sz="1200" dirty="0"/>
+            <a:r>
+              <a:rPr lang="en-US" sz="1400" b="0" i="0" u="none" strike="noStrike" baseline="0" dirty="0">
+                <a:solidFill>
+                  <a:srgbClr val="000000"/>
+                </a:solidFill>
+                <a:latin typeface="Arial" panose="020B0604020202020204" pitchFamily="34" charset="0"/>
+              </a:rPr>
+              <a:t>, W. (2018). </a:t>
+            </a:r>
+            <a:r>
+              <a:rPr lang="en-US" sz="1400" b="0" i="1" u="none" strike="noStrike" baseline="0" dirty="0">
+                <a:solidFill>
+                  <a:srgbClr val="000000"/>
+                </a:solidFill>
+                <a:latin typeface="Arial" panose="020B0604020202020204" pitchFamily="34" charset="0"/>
+              </a:rPr>
+              <a:t>Hyperparameter Tuning the Random Forest in Python. </a:t>
+            </a:r>
+            <a:r>
+              <a:rPr lang="en-US" sz="1400" b="0" i="0" u="none" strike="noStrike" baseline="0" dirty="0">
+                <a:solidFill>
+                  <a:srgbClr val="000000"/>
+                </a:solidFill>
+                <a:latin typeface="Arial" panose="020B0604020202020204" pitchFamily="34" charset="0"/>
+              </a:rPr>
+              <a:t>Towards Data Science. Retrieved on April 30, 2022 from https://towardsdatascience.com/hyperparameter-tuning-the-random-forest-in-python-using-scikit-learn-28d2aa77dd74. </a:t>
+            </a:r>
+            <a:endParaRPr lang="en-US" sz="1400" dirty="0"/>
           </a:p>
         </p:txBody>
       </p:sp>
@@ -10729,10 +10574,9 @@
               <a:buChar char="○"/>
             </a:pPr>
             <a:r>
-              <a:rPr lang="en" sz="1600" dirty="0"/>
-              <a:t>Filling of N/A values with averages</a:t>
+              <a:rPr lang="en-US" sz="1600" dirty="0"/>
+              <a:t>Checking for N/A values</a:t>
             </a:r>
-            <a:endParaRPr sz="1600" dirty="0"/>
           </a:p>
           <a:p>
             <a:pPr marL="914400" lvl="1" indent="-330200" algn="l" rtl="0">
@@ -10746,8 +10590,8 @@
               <a:buChar char="○"/>
             </a:pPr>
             <a:r>
-              <a:rPr lang="en" sz="1600" dirty="0"/>
-              <a:t>Removal of duplicate rows</a:t>
+              <a:rPr lang="en-US" sz="1600" dirty="0"/>
+              <a:t>Replacing strings with integers</a:t>
             </a:r>
             <a:endParaRPr sz="1600" dirty="0"/>
           </a:p>
@@ -10763,19 +10607,19 @@
               <a:buChar char="○"/>
             </a:pPr>
             <a:r>
-              <a:rPr lang="en" sz="1600" dirty="0"/>
-              <a:t>Feature selection</a:t>
+              <a:rPr lang="en-US" sz="1600" dirty="0"/>
+              <a:t>Oversampling</a:t>
             </a:r>
-            <a:endParaRPr dirty="0"/>
+            <a:endParaRPr sz="1600" dirty="0"/>
           </a:p>
         </p:txBody>
       </p:sp>
       <p:pic>
         <p:nvPicPr>
-          <p:cNvPr id="3076" name="Picture 4" descr="Day 7: Data cleaning — All you need to know about it | by SaiGayatri Vadali  | Becoming Human: Artificial Intelligence Magazine">
+          <p:cNvPr id="1026" name="Picture 2" descr="What is Data Preparation? (+ How to Make It Easier) - Talend | Talend">
             <a:extLst>
               <a:ext uri="{FF2B5EF4-FFF2-40B4-BE49-F238E27FC236}">
-                <a16:creationId xmlns:a16="http://schemas.microsoft.com/office/drawing/2014/main" id="{E49B57FB-F3F8-40D0-B9C0-7F91F309F6F8}"/>
+                <a16:creationId xmlns:a16="http://schemas.microsoft.com/office/drawing/2014/main" id="{B3D7513F-D012-C3F4-7016-0BCC4AA97762}"/>
               </a:ext>
             </a:extLst>
           </p:cNvPr>
@@ -10799,8 +10643,8 @@
         </p:blipFill>
         <p:spPr bwMode="auto">
           <a:xfrm>
-            <a:off x="2656683" y="2413591"/>
-            <a:ext cx="3438452" cy="2290009"/>
+            <a:off x="4572000" y="2331458"/>
+            <a:ext cx="4505118" cy="2372142"/>
           </a:xfrm>
           <a:prstGeom prst="rect">
             <a:avLst/>
@@ -10904,8 +10748,8 @@
         </p:nvSpPr>
         <p:spPr>
           <a:xfrm>
-            <a:off x="2243550" y="817307"/>
-            <a:ext cx="4656900" cy="635400"/>
+            <a:off x="2892286" y="938489"/>
+            <a:ext cx="4008163" cy="514217"/>
           </a:xfrm>
           <a:prstGeom prst="rect">
             <a:avLst/>
@@ -10917,7 +10761,7 @@
           </a:bodyPr>
           <a:lstStyle/>
           <a:p>
-            <a:pPr marL="457200" lvl="0" indent="-342900" algn="l" rtl="0">
+            <a:pPr marL="114300" lvl="0" indent="0" algn="l" rtl="0">
               <a:spcBef>
                 <a:spcPts val="0"/>
               </a:spcBef>
@@ -10925,22 +10769,18 @@
                 <a:spcPts val="0"/>
               </a:spcAft>
               <a:buSzPts val="1800"/>
-              <a:buChar char="●"/>
+              <a:buNone/>
             </a:pPr>
-            <a:r>
-              <a:rPr lang="en-US" dirty="0"/>
-              <a:t>Getting data insight with some plots</a:t>
-            </a:r>
             <a:endParaRPr dirty="0"/>
           </a:p>
         </p:txBody>
       </p:sp>
       <p:pic>
         <p:nvPicPr>
-          <p:cNvPr id="4098" name="Picture 2">
+          <p:cNvPr id="2050" name="Picture 2">
             <a:extLst>
               <a:ext uri="{FF2B5EF4-FFF2-40B4-BE49-F238E27FC236}">
-                <a16:creationId xmlns:a16="http://schemas.microsoft.com/office/drawing/2014/main" id="{01EEBEA1-902A-4AFB-A20D-247D574A71F8}"/>
+                <a16:creationId xmlns:a16="http://schemas.microsoft.com/office/drawing/2014/main" id="{24EC9736-3268-8F0B-0EFE-F3E0A122FD23}"/>
               </a:ext>
             </a:extLst>
           </p:cNvPr>
@@ -10964,8 +10804,8 @@
         </p:blipFill>
         <p:spPr bwMode="auto">
           <a:xfrm>
-            <a:off x="409575" y="1247775"/>
-            <a:ext cx="4158075" cy="2645183"/>
+            <a:off x="46177" y="1249618"/>
+            <a:ext cx="3829050" cy="3076575"/>
           </a:xfrm>
           <a:prstGeom prst="rect">
             <a:avLst/>
@@ -10984,10 +10824,10 @@
       </p:pic>
       <p:pic>
         <p:nvPicPr>
-          <p:cNvPr id="4100" name="Picture 4">
+          <p:cNvPr id="2052" name="Picture 4">
             <a:extLst>
               <a:ext uri="{FF2B5EF4-FFF2-40B4-BE49-F238E27FC236}">
-                <a16:creationId xmlns:a16="http://schemas.microsoft.com/office/drawing/2014/main" id="{80FF54BB-7BBB-4FBE-8C3E-006594603718}"/>
+                <a16:creationId xmlns:a16="http://schemas.microsoft.com/office/drawing/2014/main" id="{B6EFA7E4-4D82-162A-9FBB-85E4F5885D66}"/>
               </a:ext>
             </a:extLst>
           </p:cNvPr>
@@ -11011,8 +10851,8 @@
         </p:blipFill>
         <p:spPr bwMode="auto">
           <a:xfrm>
-            <a:off x="4567650" y="1247775"/>
-            <a:ext cx="3676650" cy="3419475"/>
+            <a:off x="3875227" y="1141580"/>
+            <a:ext cx="5222596" cy="3495741"/>
           </a:xfrm>
           <a:prstGeom prst="rect">
             <a:avLst/>
@@ -11141,7 +10981,7 @@
             </a:pPr>
             <a:r>
               <a:rPr lang="en" dirty="0"/>
-              <a:t>Random forest regression (20% data used for testing)</a:t>
+              <a:t>Random forest classifier (20% data used for testing)</a:t>
             </a:r>
           </a:p>
           <a:p>
@@ -11203,10 +11043,10 @@
       </p:sp>
       <p:graphicFrame>
         <p:nvGraphicFramePr>
-          <p:cNvPr id="3" name="Table 3">
+          <p:cNvPr id="2" name="Table 3">
             <a:extLst>
               <a:ext uri="{FF2B5EF4-FFF2-40B4-BE49-F238E27FC236}">
-                <a16:creationId xmlns:a16="http://schemas.microsoft.com/office/drawing/2014/main" id="{D7C0590A-753F-4E57-87A2-1A9AE52DAFA6}"/>
+                <a16:creationId xmlns:a16="http://schemas.microsoft.com/office/drawing/2014/main" id="{4367085F-C441-84E9-8310-9FCFBD70277D}"/>
               </a:ext>
             </a:extLst>
           </p:cNvPr>
@@ -11216,14 +11056,14 @@
           <p:nvPr>
             <p:extLst>
               <p:ext uri="{D42A27DB-BD31-4B8C-83A1-F6EECF244321}">
-                <p14:modId xmlns:p14="http://schemas.microsoft.com/office/powerpoint/2010/main" val="1567737416"/>
+                <p14:modId xmlns:p14="http://schemas.microsoft.com/office/powerpoint/2010/main" val="1879514581"/>
               </p:ext>
             </p:extLst>
           </p:nvPr>
         </p:nvGraphicFramePr>
         <p:xfrm>
-          <a:off x="2207491" y="2094617"/>
-          <a:ext cx="6096000" cy="741680"/>
+          <a:off x="2039425" y="1773975"/>
+          <a:ext cx="4619791" cy="741680"/>
         </p:xfrm>
         <a:graphic>
           <a:graphicData uri="http://schemas.openxmlformats.org/drawingml/2006/table">
@@ -11232,31 +11072,24 @@
                 <a:tableStyleId>{6BBA0CF3-2211-4D98-9032-A676FA1964EA}</a:tableStyleId>
               </a:tblPr>
               <a:tblGrid>
-                <a:gridCol w="1524000">
+                <a:gridCol w="2758053">
                   <a:extLst>
                     <a:ext uri="{9D8B030D-6E8A-4147-A177-3AD203B41FA5}">
-                      <a16:colId xmlns:a16="http://schemas.microsoft.com/office/drawing/2014/main" val="4046953188"/>
+                      <a16:colId xmlns:a16="http://schemas.microsoft.com/office/drawing/2014/main" val="841157961"/>
                     </a:ext>
                   </a:extLst>
                 </a:gridCol>
-                <a:gridCol w="1524000">
+                <a:gridCol w="913441">
                   <a:extLst>
                     <a:ext uri="{9D8B030D-6E8A-4147-A177-3AD203B41FA5}">
-                      <a16:colId xmlns:a16="http://schemas.microsoft.com/office/drawing/2014/main" val="3252673580"/>
+                      <a16:colId xmlns:a16="http://schemas.microsoft.com/office/drawing/2014/main" val="2685743825"/>
                     </a:ext>
                   </a:extLst>
                 </a:gridCol>
-                <a:gridCol w="1524000">
+                <a:gridCol w="948297">
                   <a:extLst>
                     <a:ext uri="{9D8B030D-6E8A-4147-A177-3AD203B41FA5}">
-                      <a16:colId xmlns:a16="http://schemas.microsoft.com/office/drawing/2014/main" val="860932753"/>
-                    </a:ext>
-                  </a:extLst>
-                </a:gridCol>
-                <a:gridCol w="1524000">
-                  <a:extLst>
-                    <a:ext uri="{9D8B030D-6E8A-4147-A177-3AD203B41FA5}">
-                      <a16:colId xmlns:a16="http://schemas.microsoft.com/office/drawing/2014/main" val="1700973999"/>
+                      <a16:colId xmlns:a16="http://schemas.microsoft.com/office/drawing/2014/main" val="603671822"/>
                     </a:ext>
                   </a:extLst>
                 </a:gridCol>
@@ -11279,7 +11112,7 @@
                     <a:p>
                       <a:r>
                         <a:rPr lang="en-US" dirty="0"/>
-                        <a:t>MAE</a:t>
+                        <a:t>Accuracy</a:t>
                       </a:r>
                     </a:p>
                   </a:txBody>
@@ -11292,7 +11125,27 @@
                     <a:p>
                       <a:r>
                         <a:rPr lang="en-US" dirty="0"/>
-                        <a:t>MSE</a:t>
+                        <a:t>Precision</a:t>
+                      </a:r>
+                    </a:p>
+                  </a:txBody>
+                  <a:tcPr/>
+                </a:tc>
+                <a:extLst>
+                  <a:ext uri="{0D108BD9-81ED-4DB2-BD59-A6C34878D82A}">
+                    <a16:rowId xmlns:a16="http://schemas.microsoft.com/office/drawing/2014/main" val="2390831394"/>
+                  </a:ext>
+                </a:extLst>
+              </a:tr>
+              <a:tr h="370840">
+                <a:tc>
+                  <a:txBody>
+                    <a:bodyPr/>
+                    <a:lstStyle/>
+                    <a:p>
+                      <a:r>
+                        <a:rPr lang="en-US" dirty="0"/>
+                        <a:t>Random Forest Classifier</a:t>
                       </a:r>
                     </a:p>
                   </a:txBody>
@@ -11305,27 +11158,7 @@
                     <a:p>
                       <a:r>
                         <a:rPr lang="en-US" dirty="0"/>
-                        <a:t>RMSE</a:t>
-                      </a:r>
-                    </a:p>
-                  </a:txBody>
-                  <a:tcPr/>
-                </a:tc>
-                <a:extLst>
-                  <a:ext uri="{0D108BD9-81ED-4DB2-BD59-A6C34878D82A}">
-                    <a16:rowId xmlns:a16="http://schemas.microsoft.com/office/drawing/2014/main" val="2241678"/>
-                  </a:ext>
-                </a:extLst>
-              </a:tr>
-              <a:tr h="370840">
-                <a:tc>
-                  <a:txBody>
-                    <a:bodyPr/>
-                    <a:lstStyle/>
-                    <a:p>
-                      <a:r>
-                        <a:rPr lang="en-US" dirty="0"/>
-                        <a:t>Random Forest</a:t>
+                        <a:t>96.9%</a:t>
                       </a:r>
                     </a:p>
                   </a:txBody>
@@ -11338,33 +11171,7 @@
                     <a:p>
                       <a:r>
                         <a:rPr lang="en-US" dirty="0"/>
-                        <a:t>0.61</a:t>
-                      </a:r>
-                    </a:p>
-                  </a:txBody>
-                  <a:tcPr/>
-                </a:tc>
-                <a:tc>
-                  <a:txBody>
-                    <a:bodyPr/>
-                    <a:lstStyle/>
-                    <a:p>
-                      <a:r>
-                        <a:rPr lang="en-US" dirty="0"/>
-                        <a:t>0.65</a:t>
-                      </a:r>
-                    </a:p>
-                  </a:txBody>
-                  <a:tcPr/>
-                </a:tc>
-                <a:tc>
-                  <a:txBody>
-                    <a:bodyPr/>
-                    <a:lstStyle/>
-                    <a:p>
-                      <a:r>
-                        <a:rPr lang="en-US" dirty="0"/>
-                        <a:t>0.81</a:t>
+                        <a:t>94.2%</a:t>
                       </a:r>
                     </a:p>
                   </a:txBody>
@@ -11372,7 +11179,7 @@
                 </a:tc>
                 <a:extLst>
                   <a:ext uri="{0D108BD9-81ED-4DB2-BD59-A6C34878D82A}">
-                    <a16:rowId xmlns:a16="http://schemas.microsoft.com/office/drawing/2014/main" val="2133260821"/>
+                    <a16:rowId xmlns:a16="http://schemas.microsoft.com/office/drawing/2014/main" val="2373914690"/>
                   </a:ext>
                 </a:extLst>
               </a:tr>

</xml_diff>